<commit_message>
Modified docx and pptx
</commit_message>
<xml_diff>
--- a/doc/Projekt Racketenwerfer.pptx
+++ b/doc/Projekt Racketenwerfer.pptx
@@ -3794,8 +3794,8 @@
               <a:t>Projekt </a:t>
             </a:r>
             <a:r>
-              <a:rPr lang="de-DE" dirty="0" err="1"/>
-              <a:t>Racketenwerfer</a:t>
+              <a:rPr lang="de-DE" dirty="0" smtClean="0"/>
+              <a:t>Raketenwerfer</a:t>
             </a:r>
             <a:endParaRPr lang="de-DE" dirty="0"/>
           </a:p>
@@ -3900,34 +3900,21 @@
         <p:spPr/>
         <p:txBody>
           <a:bodyPr>
-            <a:normAutofit fontScale="77500" lnSpcReduction="20000"/>
+            <a:normAutofit/>
           </a:bodyPr>
           <a:lstStyle/>
           <a:p>
             <a:r>
-              <a:rPr lang="de-DE" dirty="0"/>
+              <a:rPr lang="de-DE" dirty="0" smtClean="0"/>
               <a:t>Grundgedanken</a:t>
             </a:r>
           </a:p>
           <a:p>
-            <a:pPr lvl="1"/>
-            <a:r>
-              <a:rPr lang="de-DE" dirty="0"/>
-              <a:t>Ziel</a:t>
-            </a:r>
-          </a:p>
-          <a:p>
-            <a:pPr lvl="1"/>
-            <a:r>
-              <a:rPr lang="de-DE" dirty="0"/>
-              <a:t>Vorgehen</a:t>
-            </a:r>
-          </a:p>
-          <a:p>
-            <a:r>
-              <a:rPr lang="de-DE" dirty="0"/>
+            <a:r>
+              <a:rPr lang="de-DE" dirty="0" smtClean="0"/>
               <a:t>Netzwerkaufbau</a:t>
             </a:r>
+            <a:endParaRPr lang="de-DE" dirty="0"/>
           </a:p>
           <a:p>
             <a:r>
@@ -3949,61 +3936,26 @@
           </a:p>
           <a:p>
             <a:r>
-              <a:rPr lang="de-DE" dirty="0" err="1"/>
-              <a:t>Raspberry</a:t>
-            </a:r>
-            <a:r>
               <a:rPr lang="de-DE" dirty="0"/>
-              <a:t> Pi</a:t>
-            </a:r>
-          </a:p>
-          <a:p>
-            <a:pPr lvl="1"/>
-            <a:r>
-              <a:rPr lang="de-DE" dirty="0" err="1"/>
-              <a:t>Nodejs</a:t>
-            </a:r>
-            <a:endParaRPr lang="de-DE" dirty="0"/>
-          </a:p>
-          <a:p>
-            <a:pPr lvl="1"/>
-            <a:r>
-              <a:rPr lang="de-DE" dirty="0"/>
-              <a:t>Treiber</a:t>
-            </a:r>
-          </a:p>
-          <a:p>
-            <a:pPr lvl="2"/>
-            <a:r>
-              <a:rPr lang="de-DE" dirty="0"/>
-              <a:t>Konfiguration</a:t>
-            </a:r>
-          </a:p>
-          <a:p>
-            <a:pPr lvl="1"/>
-            <a:r>
-              <a:rPr lang="de-DE" dirty="0"/>
-              <a:t>Socket.io Server</a:t>
-            </a:r>
-          </a:p>
-          <a:p>
-            <a:r>
-              <a:rPr lang="de-DE" dirty="0"/>
-              <a:t>Smartphone</a:t>
-            </a:r>
-          </a:p>
-          <a:p>
-            <a:pPr lvl="1"/>
-            <a:r>
-              <a:rPr lang="de-DE" dirty="0"/>
-              <a:t>App Konfiguration</a:t>
-            </a:r>
-          </a:p>
-          <a:p>
-            <a:r>
-              <a:rPr lang="de-DE" dirty="0"/>
+              <a:t>Raspberry </a:t>
+            </a:r>
+            <a:r>
+              <a:rPr lang="de-DE" dirty="0" smtClean="0"/>
+              <a:t>Pi</a:t>
+            </a:r>
+          </a:p>
+          <a:p>
+            <a:r>
+              <a:rPr lang="de-DE" dirty="0" smtClean="0"/>
+              <a:t>Android App</a:t>
+            </a:r>
+          </a:p>
+          <a:p>
+            <a:r>
+              <a:rPr lang="de-DE" dirty="0" smtClean="0"/>
               <a:t>Demo</a:t>
             </a:r>
+            <a:endParaRPr lang="de-DE" dirty="0"/>
           </a:p>
           <a:p>
             <a:pPr lvl="1"/>
@@ -4057,9 +4009,10 @@
           <a:lstStyle/>
           <a:p>
             <a:r>
-              <a:rPr lang="de-DE" dirty="0"/>
+              <a:rPr lang="de-DE" dirty="0" smtClean="0"/>
               <a:t>Grundgedanken</a:t>
             </a:r>
+            <a:endParaRPr lang="de-DE" dirty="0"/>
           </a:p>
         </p:txBody>
       </p:sp>
@@ -4129,9 +4082,10 @@
               <a:t> und </a:t>
             </a:r>
             <a:r>
-              <a:rPr lang="de-CH"/>
+              <a:rPr lang="de-CH" dirty="0" err="1"/>
               <a:t>Fire</a:t>
             </a:r>
+            <a:endParaRPr lang="de-CH" dirty="0"/>
           </a:p>
         </p:txBody>
       </p:sp>
@@ -4866,7 +4820,73 @@
           <a:bodyPr/>
           <a:lstStyle/>
           <a:p>
-            <a:endParaRPr lang="de-CH" dirty="0"/>
+            <a:r>
+              <a:rPr lang="de-CH" dirty="0" smtClean="0"/>
+              <a:t>Voll funktionsfähiger Accesspoint (</a:t>
+            </a:r>
+            <a:r>
+              <a:rPr lang="de-CH" dirty="0" err="1" smtClean="0"/>
+              <a:t>hostapd</a:t>
+            </a:r>
+            <a:r>
+              <a:rPr lang="de-CH" dirty="0" smtClean="0"/>
+              <a:t>, </a:t>
+            </a:r>
+            <a:r>
+              <a:rPr lang="de-CH" dirty="0" err="1" smtClean="0"/>
+              <a:t>dnsmasq</a:t>
+            </a:r>
+            <a:r>
+              <a:rPr lang="de-CH" dirty="0" smtClean="0"/>
+              <a:t>)  (+ Routing)</a:t>
+            </a:r>
+          </a:p>
+          <a:p>
+            <a:r>
+              <a:rPr lang="de-CH" dirty="0" err="1" smtClean="0"/>
+              <a:t>NodeJS</a:t>
+            </a:r>
+            <a:r>
+              <a:rPr lang="de-CH" dirty="0" smtClean="0"/>
+              <a:t>-Installation über NVM</a:t>
+            </a:r>
+          </a:p>
+          <a:p>
+            <a:r>
+              <a:rPr lang="de-CH" dirty="0" smtClean="0"/>
+              <a:t>Umgebaute Version des «</a:t>
+            </a:r>
+            <a:r>
+              <a:rPr lang="de-CH" dirty="0" err="1" smtClean="0"/>
+              <a:t>thunder-connector</a:t>
+            </a:r>
+            <a:r>
+              <a:rPr lang="de-CH" dirty="0" smtClean="0"/>
+              <a:t>» Moduls</a:t>
+            </a:r>
+            <a:r>
+              <a:rPr lang="de-CH" dirty="0"/>
+              <a:t> </a:t>
+            </a:r>
+            <a:r>
+              <a:rPr lang="de-CH" dirty="0" smtClean="0"/>
+              <a:t>(mit </a:t>
+            </a:r>
+            <a:r>
+              <a:rPr lang="de-CH" dirty="0" err="1" smtClean="0"/>
+              <a:t>node-hid</a:t>
+            </a:r>
+            <a:r>
+              <a:rPr lang="de-CH" dirty="0" smtClean="0"/>
+              <a:t>)</a:t>
+            </a:r>
+          </a:p>
+          <a:p>
+            <a:r>
+              <a:rPr lang="de-CH" dirty="0" smtClean="0"/>
+              <a:t>Einfacher Socket.IO Server </a:t>
+            </a:r>
+            <a:endParaRPr lang="de-CH" dirty="0" smtClean="0"/>
           </a:p>
         </p:txBody>
       </p:sp>
@@ -4952,9 +4972,21 @@
           </a:p>
           <a:p>
             <a:r>
-              <a:rPr lang="de-CH" dirty="0"/>
-              <a:t>Befehle über JavaScript</a:t>
-            </a:r>
+              <a:rPr lang="de-CH" dirty="0" smtClean="0"/>
+              <a:t>Entwickelt mit </a:t>
+            </a:r>
+            <a:r>
+              <a:rPr lang="de-CH" dirty="0" err="1" smtClean="0"/>
+              <a:t>AngularJS</a:t>
+            </a:r>
+            <a:endParaRPr lang="de-CH" dirty="0"/>
+          </a:p>
+          <a:p>
+            <a:r>
+              <a:rPr lang="de-CH" dirty="0" smtClean="0"/>
+              <a:t>Sehr einfach aufgebaut</a:t>
+            </a:r>
+            <a:endParaRPr lang="de-CH" dirty="0"/>
           </a:p>
           <a:p>
             <a:endParaRPr lang="de-CH" dirty="0"/>
@@ -4979,64 +5011,6 @@
           <a:xfrm>
             <a:off x="5591944" y="1600200"/>
             <a:ext cx="6143625" cy="3409950"/>
-          </a:xfrm>
-          <a:prstGeom prst="rect">
-            <a:avLst/>
-          </a:prstGeom>
-          <a:ln>
-            <a:noFill/>
-          </a:ln>
-          <a:effectLst>
-            <a:outerShdw blurRad="292100" dist="139700" dir="2700000" algn="tl" rotWithShape="0">
-              <a:srgbClr val="333333">
-                <a:alpha val="65000"/>
-              </a:srgbClr>
-            </a:outerShdw>
-          </a:effectLst>
-        </p:spPr>
-      </p:pic>
-      <p:pic>
-        <p:nvPicPr>
-          <p:cNvPr id="6" name="Grafik 5"/>
-          <p:cNvPicPr>
-            <a:picLocks noChangeAspect="1"/>
-          </p:cNvPicPr>
-          <p:nvPr/>
-        </p:nvPicPr>
-        <p:blipFill>
-          <a:blip r:embed="rId3"/>
-          <a:stretch>
-            <a:fillRect/>
-          </a:stretch>
-        </p:blipFill>
-        <p:spPr>
-          <a:xfrm rot="5400000">
-            <a:off x="1415480" y="3212976"/>
-            <a:ext cx="3240360" cy="3240360"/>
-          </a:xfrm>
-          <a:prstGeom prst="rect">
-            <a:avLst/>
-          </a:prstGeom>
-        </p:spPr>
-      </p:pic>
-      <p:pic>
-        <p:nvPicPr>
-          <p:cNvPr id="7" name="Grafik 6"/>
-          <p:cNvPicPr>
-            <a:picLocks noChangeAspect="1"/>
-          </p:cNvPicPr>
-          <p:nvPr/>
-        </p:nvPicPr>
-        <p:blipFill>
-          <a:blip r:embed="rId2"/>
-          <a:stretch>
-            <a:fillRect/>
-          </a:stretch>
-        </p:blipFill>
-        <p:spPr>
-          <a:xfrm>
-            <a:off x="1775520" y="4149080"/>
-            <a:ext cx="2464967" cy="1368152"/>
           </a:xfrm>
           <a:prstGeom prst="rect">
             <a:avLst/>
@@ -5121,9 +5095,26 @@
           <a:lstStyle/>
           <a:p>
             <a:r>
+              <a:rPr lang="de-CH" dirty="0" smtClean="0"/>
+              <a:t>Kurzer </a:t>
+            </a:r>
+            <a:r>
               <a:rPr lang="de-CH" dirty="0"/>
-              <a:t>Beginn der Live Demo </a:t>
-            </a:r>
+              <a:t>E</a:t>
+            </a:r>
+            <a:r>
+              <a:rPr lang="de-CH" dirty="0" smtClean="0"/>
+              <a:t>inblick in den Quellcode</a:t>
+            </a:r>
+          </a:p>
+          <a:p>
+            <a:r>
+              <a:rPr lang="de-CH" dirty="0" smtClean="0"/>
+              <a:t>Demo des Rocket Launchers</a:t>
+            </a:r>
+          </a:p>
+          <a:p>
+            <a:endParaRPr lang="de-CH" dirty="0"/>
           </a:p>
         </p:txBody>
       </p:sp>
@@ -5143,7 +5134,7 @@
         </p:blipFill>
         <p:spPr>
           <a:xfrm>
-            <a:off x="5231904" y="2364925"/>
+            <a:off x="5879976" y="2204864"/>
             <a:ext cx="4474852" cy="3731075"/>
           </a:xfrm>
           <a:prstGeom prst="rect">

</xml_diff>